<commit_message>
add k8s support issue #27
</commit_message>
<xml_diff>
--- a/Bet.AspNetCore.EvenGrid.pptx
+++ b/Bet.AspNetCore.EvenGrid.pptx
@@ -6,7 +6,9 @@
   </p:sldMasterIdLst>
   <p:sldIdLst>
     <p:sldId id="256" r:id="rId2"/>
-    <p:sldId id="257" r:id="rId3"/>
+    <p:sldId id="258" r:id="rId3"/>
+    <p:sldId id="260" r:id="rId4"/>
+    <p:sldId id="257" r:id="rId5"/>
   </p:sldIdLst>
   <p:sldSz cx="12192000" cy="6858000"/>
   <p:notesSz cx="6858000" cy="9144000"/>
@@ -105,6 +107,11 @@
       </a:defRPr>
     </a:lvl9pPr>
   </p:defaultTextStyle>
+  <p:extLst>
+    <p:ext uri="{EFAFB233-063F-42B5-8137-9DF3F51BA10A}">
+      <p15:sldGuideLst xmlns:p15="http://schemas.microsoft.com/office/powerpoint/2012/main"/>
+    </p:ext>
+  </p:extLst>
 </p:presentation>
 </file>
 
@@ -279,7 +286,7 @@
           <a:p>
             <a:fld id="{48A87A34-81AB-432B-8DAE-1953F412C126}" type="datetimeFigureOut">
               <a:rPr lang="en-US" dirty="0"/>
-              <a:t>11/8/2019</a:t>
+              <a:t>11/11/2019</a:t>
             </a:fld>
             <a:endParaRPr lang="en-US" dirty="0"/>
           </a:p>
@@ -586,7 +593,7 @@
           <a:p>
             <a:fld id="{48A87A34-81AB-432B-8DAE-1953F412C126}" type="datetimeFigureOut">
               <a:rPr lang="en-US" dirty="0"/>
-              <a:t>11/8/2019</a:t>
+              <a:t>11/11/2019</a:t>
             </a:fld>
             <a:endParaRPr lang="en-US" dirty="0"/>
           </a:p>
@@ -803,7 +810,7 @@
           <a:p>
             <a:fld id="{48A87A34-81AB-432B-8DAE-1953F412C126}" type="datetimeFigureOut">
               <a:rPr lang="en-US" dirty="0"/>
-              <a:t>11/8/2019</a:t>
+              <a:t>11/11/2019</a:t>
             </a:fld>
             <a:endParaRPr lang="en-US" dirty="0"/>
           </a:p>
@@ -1089,7 +1096,7 @@
           <a:p>
             <a:fld id="{48A87A34-81AB-432B-8DAE-1953F412C126}" type="datetimeFigureOut">
               <a:rPr lang="en-US" dirty="0"/>
-              <a:t>11/8/2019</a:t>
+              <a:t>11/11/2019</a:t>
             </a:fld>
             <a:endParaRPr lang="en-US" dirty="0"/>
           </a:p>
@@ -1538,7 +1545,7 @@
           <a:p>
             <a:fld id="{48A87A34-81AB-432B-8DAE-1953F412C126}" type="datetimeFigureOut">
               <a:rPr lang="en-US" dirty="0"/>
-              <a:t>11/8/2019</a:t>
+              <a:t>11/11/2019</a:t>
             </a:fld>
             <a:endParaRPr lang="en-US" dirty="0"/>
           </a:p>
@@ -2109,7 +2116,7 @@
           <a:p>
             <a:fld id="{48A87A34-81AB-432B-8DAE-1953F412C126}" type="datetimeFigureOut">
               <a:rPr lang="en-US" dirty="0"/>
-              <a:t>11/8/2019</a:t>
+              <a:t>11/11/2019</a:t>
             </a:fld>
             <a:endParaRPr lang="en-US" dirty="0"/>
           </a:p>
@@ -2956,7 +2963,7 @@
           <a:p>
             <a:fld id="{48A87A34-81AB-432B-8DAE-1953F412C126}" type="datetimeFigureOut">
               <a:rPr lang="en-US" dirty="0"/>
-              <a:t>11/8/2019</a:t>
+              <a:t>11/11/2019</a:t>
             </a:fld>
             <a:endParaRPr lang="en-US" dirty="0"/>
           </a:p>
@@ -3156,7 +3163,7 @@
           <a:p>
             <a:fld id="{48A87A34-81AB-432B-8DAE-1953F412C126}" type="datetimeFigureOut">
               <a:rPr lang="en-US" dirty="0"/>
-              <a:t>11/8/2019</a:t>
+              <a:t>11/11/2019</a:t>
             </a:fld>
             <a:endParaRPr lang="en-US" dirty="0"/>
           </a:p>
@@ -3365,7 +3372,7 @@
           <a:p>
             <a:fld id="{48A87A34-81AB-432B-8DAE-1953F412C126}" type="datetimeFigureOut">
               <a:rPr lang="en-US" dirty="0"/>
-              <a:t>11/8/2019</a:t>
+              <a:t>11/11/2019</a:t>
             </a:fld>
             <a:endParaRPr lang="en-US" dirty="0"/>
           </a:p>
@@ -3565,7 +3572,7 @@
           <a:p>
             <a:fld id="{48A87A34-81AB-432B-8DAE-1953F412C126}" type="datetimeFigureOut">
               <a:rPr lang="en-US" dirty="0"/>
-              <a:t>11/8/2019</a:t>
+              <a:t>11/11/2019</a:t>
             </a:fld>
             <a:endParaRPr lang="en-US" dirty="0"/>
           </a:p>
@@ -3840,7 +3847,7 @@
           <a:p>
             <a:fld id="{48A87A34-81AB-432B-8DAE-1953F412C126}" type="datetimeFigureOut">
               <a:rPr lang="en-US" dirty="0"/>
-              <a:t>11/8/2019</a:t>
+              <a:t>11/11/2019</a:t>
             </a:fld>
             <a:endParaRPr lang="en-US" dirty="0"/>
           </a:p>
@@ -4102,7 +4109,7 @@
           <a:p>
             <a:fld id="{48A87A34-81AB-432B-8DAE-1953F412C126}" type="datetimeFigureOut">
               <a:rPr lang="en-US" dirty="0"/>
-              <a:t>11/8/2019</a:t>
+              <a:t>11/11/2019</a:t>
             </a:fld>
             <a:endParaRPr lang="en-US" dirty="0"/>
           </a:p>
@@ -4512,7 +4519,7 @@
           <a:p>
             <a:fld id="{48A87A34-81AB-432B-8DAE-1953F412C126}" type="datetimeFigureOut">
               <a:rPr lang="en-US" dirty="0"/>
-              <a:t>11/8/2019</a:t>
+              <a:t>11/11/2019</a:t>
             </a:fld>
             <a:endParaRPr lang="en-US" dirty="0"/>
           </a:p>
@@ -4655,7 +4662,7 @@
           <a:p>
             <a:fld id="{48A87A34-81AB-432B-8DAE-1953F412C126}" type="datetimeFigureOut">
               <a:rPr lang="en-US" dirty="0"/>
-              <a:t>11/8/2019</a:t>
+              <a:t>11/11/2019</a:t>
             </a:fld>
             <a:endParaRPr lang="en-US" dirty="0"/>
           </a:p>
@@ -4775,7 +4782,7 @@
           <a:p>
             <a:fld id="{48A87A34-81AB-432B-8DAE-1953F412C126}" type="datetimeFigureOut">
               <a:rPr lang="en-US" dirty="0"/>
-              <a:t>11/8/2019</a:t>
+              <a:t>11/11/2019</a:t>
             </a:fld>
             <a:endParaRPr lang="en-US" dirty="0"/>
           </a:p>
@@ -5049,7 +5056,7 @@
           <a:p>
             <a:fld id="{48A87A34-81AB-432B-8DAE-1953F412C126}" type="datetimeFigureOut">
               <a:rPr lang="en-US" dirty="0"/>
-              <a:t>11/8/2019</a:t>
+              <a:t>11/11/2019</a:t>
             </a:fld>
             <a:endParaRPr lang="en-US" dirty="0"/>
           </a:p>
@@ -5356,7 +5363,7 @@
           <a:p>
             <a:fld id="{48A87A34-81AB-432B-8DAE-1953F412C126}" type="datetimeFigureOut">
               <a:rPr lang="en-US" dirty="0"/>
-              <a:t>11/8/2019</a:t>
+              <a:t>11/11/2019</a:t>
             </a:fld>
             <a:endParaRPr lang="en-US" dirty="0"/>
           </a:p>
@@ -5605,7 +5612,7 @@
             <a:fld id="{48A87A34-81AB-432B-8DAE-1953F412C126}" type="datetimeFigureOut">
               <a:rPr lang="en-US" dirty="0"/>
               <a:pPr/>
-              <a:t>11/8/2019</a:t>
+              <a:t>11/11/2019</a:t>
             </a:fld>
             <a:endParaRPr lang="en-US" dirty="0"/>
           </a:p>
@@ -6066,7 +6073,11 @@
           <a:bodyPr/>
           <a:lstStyle/>
           <a:p>
-            <a:endParaRPr lang="en-US"/>
+            <a:r>
+              <a:rPr lang="en-US" dirty="0" err="1"/>
+              <a:t>Bet.AspNetCore.EventGrid</a:t>
+            </a:r>
+            <a:endParaRPr lang="en-US" dirty="0"/>
           </a:p>
         </p:txBody>
       </p:sp>
@@ -6091,7 +6102,10 @@
           <a:bodyPr/>
           <a:lstStyle/>
           <a:p>
-            <a:endParaRPr lang="en-US"/>
+            <a:r>
+              <a:rPr lang="en-US" dirty="0"/>
+              <a:t>Azure Event Grid Topic</a:t>
+            </a:r>
           </a:p>
         </p:txBody>
       </p:sp>
@@ -6147,7 +6161,7 @@
         </p:blipFill>
         <p:spPr>
           <a:xfrm>
-            <a:off x="8963082" y="2330751"/>
+            <a:off x="6626469" y="2851489"/>
             <a:ext cx="719390" cy="719390"/>
           </a:xfrm>
           <a:prstGeom prst="rect">
@@ -6157,10 +6171,10 @@
       </p:pic>
       <p:pic>
         <p:nvPicPr>
-          <p:cNvPr id="6" name="Graphic 5">
+          <p:cNvPr id="5" name="Graphic 4">
             <a:extLst>
               <a:ext uri="{FF2B5EF4-FFF2-40B4-BE49-F238E27FC236}">
-                <a16:creationId xmlns:a16="http://schemas.microsoft.com/office/drawing/2014/main" id="{60A0F9FF-A627-4D3E-92C3-233670729A3D}"/>
+                <a16:creationId xmlns:a16="http://schemas.microsoft.com/office/drawing/2014/main" id="{3B341D1C-355A-4BAB-A45C-A83E33CE0946}"/>
               </a:ext>
             </a:extLst>
           </p:cNvPr>
@@ -6183,7 +6197,7 @@
         </p:blipFill>
         <p:spPr>
           <a:xfrm>
-            <a:off x="3469298" y="2193681"/>
+            <a:off x="217031" y="1730815"/>
             <a:ext cx="719390" cy="719390"/>
           </a:xfrm>
           <a:prstGeom prst="rect">
@@ -6191,12 +6205,388 @@
           </a:prstGeom>
         </p:spPr>
       </p:pic>
+      <p:sp>
+        <p:nvSpPr>
+          <p:cNvPr id="8" name="Rectangle 7">
+            <a:extLst>
+              <a:ext uri="{FF2B5EF4-FFF2-40B4-BE49-F238E27FC236}">
+                <a16:creationId xmlns:a16="http://schemas.microsoft.com/office/drawing/2014/main" id="{C9889E78-07FD-4FD2-A82A-3656E3DD2D95}"/>
+              </a:ext>
+            </a:extLst>
+          </p:cNvPr>
+          <p:cNvSpPr/>
+          <p:nvPr/>
+        </p:nvSpPr>
+        <p:spPr>
+          <a:xfrm>
+            <a:off x="6626469" y="3668465"/>
+            <a:ext cx="3280963" cy="276999"/>
+          </a:xfrm>
+          <a:prstGeom prst="rect">
+            <a:avLst/>
+          </a:prstGeom>
+        </p:spPr>
+        <p:txBody>
+          <a:bodyPr wrap="none">
+            <a:spAutoFit/>
+          </a:bodyPr>
+          <a:lstStyle/>
+          <a:p>
+            <a:r>
+              <a:rPr lang="en-US" sz="1200" dirty="0"/>
+              <a:t>https://bet-eventgrid.azurewebsites.net/webhooks</a:t>
+            </a:r>
+          </a:p>
+        </p:txBody>
+      </p:sp>
+      <p:sp>
+        <p:nvSpPr>
+          <p:cNvPr id="3" name="Rectangle 2">
+            <a:extLst>
+              <a:ext uri="{FF2B5EF4-FFF2-40B4-BE49-F238E27FC236}">
+                <a16:creationId xmlns:a16="http://schemas.microsoft.com/office/drawing/2014/main" id="{845FAB11-C685-439C-B194-B1FF170364AF}"/>
+              </a:ext>
+            </a:extLst>
+          </p:cNvPr>
+          <p:cNvSpPr/>
+          <p:nvPr/>
+        </p:nvSpPr>
+        <p:spPr>
+          <a:xfrm>
+            <a:off x="615906" y="2651030"/>
+            <a:ext cx="1330704" cy="1426128"/>
+          </a:xfrm>
+          <a:prstGeom prst="rect">
+            <a:avLst/>
+          </a:prstGeom>
+          <a:solidFill>
+            <a:schemeClr val="tx2">
+              <a:lumMod val="40000"/>
+              <a:lumOff val="60000"/>
+            </a:schemeClr>
+          </a:solidFill>
+        </p:spPr>
+        <p:style>
+          <a:lnRef idx="2">
+            <a:schemeClr val="accent1">
+              <a:shade val="50000"/>
+            </a:schemeClr>
+          </a:lnRef>
+          <a:fillRef idx="1">
+            <a:schemeClr val="accent1"/>
+          </a:fillRef>
+          <a:effectRef idx="0">
+            <a:schemeClr val="accent1"/>
+          </a:effectRef>
+          <a:fontRef idx="minor">
+            <a:schemeClr val="lt1"/>
+          </a:fontRef>
+        </p:style>
+        <p:txBody>
+          <a:bodyPr rtlCol="0" anchor="ctr"/>
+          <a:lstStyle/>
+          <a:p>
+            <a:pPr algn="ctr"/>
+            <a:r>
+              <a:rPr lang="en-US" dirty="0"/>
+              <a:t>Broadcaster App</a:t>
+            </a:r>
+          </a:p>
+        </p:txBody>
+      </p:sp>
+      <p:sp>
+        <p:nvSpPr>
+          <p:cNvPr id="11" name="Rectangle 10">
+            <a:extLst>
+              <a:ext uri="{FF2B5EF4-FFF2-40B4-BE49-F238E27FC236}">
+                <a16:creationId xmlns:a16="http://schemas.microsoft.com/office/drawing/2014/main" id="{02EA3AD8-D016-4D06-9080-53E6F6EEA7E8}"/>
+              </a:ext>
+            </a:extLst>
+          </p:cNvPr>
+          <p:cNvSpPr/>
+          <p:nvPr/>
+        </p:nvSpPr>
+        <p:spPr>
+          <a:xfrm>
+            <a:off x="6626469" y="4077158"/>
+            <a:ext cx="3540777" cy="276999"/>
+          </a:xfrm>
+          <a:prstGeom prst="rect">
+            <a:avLst/>
+          </a:prstGeom>
+        </p:spPr>
+        <p:txBody>
+          <a:bodyPr wrap="none">
+            <a:spAutoFit/>
+          </a:bodyPr>
+          <a:lstStyle/>
+          <a:p>
+            <a:r>
+              <a:rPr lang="en-US" sz="1200" dirty="0"/>
+              <a:t>https://bet-eventgrid.azurewebsites.net/events/viewer</a:t>
+            </a:r>
+          </a:p>
+        </p:txBody>
+      </p:sp>
+      <p:cxnSp>
+        <p:nvCxnSpPr>
+          <p:cNvPr id="12" name="Straight Arrow Connector 11">
+            <a:extLst>
+              <a:ext uri="{FF2B5EF4-FFF2-40B4-BE49-F238E27FC236}">
+                <a16:creationId xmlns:a16="http://schemas.microsoft.com/office/drawing/2014/main" id="{57C44BA0-1471-47F0-95EF-92EFB1DFD6C6}"/>
+              </a:ext>
+            </a:extLst>
+          </p:cNvPr>
+          <p:cNvCxnSpPr>
+            <a:cxnSpLocks/>
+            <a:stCxn id="3" idx="3"/>
+          </p:cNvCxnSpPr>
+          <p:nvPr/>
+        </p:nvCxnSpPr>
+        <p:spPr>
+          <a:xfrm>
+            <a:off x="1946610" y="3364094"/>
+            <a:ext cx="2328176" cy="16683"/>
+          </a:xfrm>
+          <a:prstGeom prst="straightConnector1">
+            <a:avLst/>
+          </a:prstGeom>
+          <a:ln>
+            <a:tailEnd type="triangle"/>
+          </a:ln>
+        </p:spPr>
+        <p:style>
+          <a:lnRef idx="1">
+            <a:schemeClr val="accent1"/>
+          </a:lnRef>
+          <a:fillRef idx="0">
+            <a:schemeClr val="accent1"/>
+          </a:fillRef>
+          <a:effectRef idx="0">
+            <a:schemeClr val="accent1"/>
+          </a:effectRef>
+          <a:fontRef idx="minor">
+            <a:schemeClr val="tx1"/>
+          </a:fontRef>
+        </p:style>
+      </p:cxnSp>
+      <p:grpSp>
+        <p:nvGrpSpPr>
+          <p:cNvPr id="13" name="Group 12">
+            <a:extLst>
+              <a:ext uri="{FF2B5EF4-FFF2-40B4-BE49-F238E27FC236}">
+                <a16:creationId xmlns:a16="http://schemas.microsoft.com/office/drawing/2014/main" id="{D10047D3-5B0C-4941-A8CE-86FA0CF075B1}"/>
+              </a:ext>
+            </a:extLst>
+          </p:cNvPr>
+          <p:cNvGrpSpPr/>
+          <p:nvPr/>
+        </p:nvGrpSpPr>
+        <p:grpSpPr>
+          <a:xfrm>
+            <a:off x="4274786" y="2844648"/>
+            <a:ext cx="1389996" cy="1232510"/>
+            <a:chOff x="4104783" y="2408583"/>
+            <a:chExt cx="1389996" cy="1232510"/>
+          </a:xfrm>
+        </p:grpSpPr>
+        <p:pic>
+          <p:nvPicPr>
+            <p:cNvPr id="6" name="Graphic 5">
+              <a:extLst>
+                <a:ext uri="{FF2B5EF4-FFF2-40B4-BE49-F238E27FC236}">
+                  <a16:creationId xmlns:a16="http://schemas.microsoft.com/office/drawing/2014/main" id="{60A0F9FF-A627-4D3E-92C3-233670729A3D}"/>
+                </a:ext>
+              </a:extLst>
+            </p:cNvPr>
+            <p:cNvPicPr>
+              <a:picLocks noChangeAspect="1"/>
+            </p:cNvPicPr>
+            <p:nvPr/>
+          </p:nvPicPr>
+          <p:blipFill>
+            <a:blip r:embed="rId5">
+              <a:extLst>
+                <a:ext uri="{96DAC541-7B7A-43D3-8B79-37D633B846F1}">
+                  <asvg:svgBlip xmlns:asvg="http://schemas.microsoft.com/office/drawing/2016/SVG/main" r:embed="rId6"/>
+                </a:ext>
+              </a:extLst>
+            </a:blip>
+            <a:stretch>
+              <a:fillRect/>
+            </a:stretch>
+          </p:blipFill>
+          <p:spPr>
+            <a:xfrm>
+              <a:off x="4440086" y="2408583"/>
+              <a:ext cx="719390" cy="719390"/>
+            </a:xfrm>
+            <a:prstGeom prst="rect">
+              <a:avLst/>
+            </a:prstGeom>
+          </p:spPr>
+        </p:pic>
+        <p:sp>
+          <p:nvSpPr>
+            <p:cNvPr id="2" name="TextBox 1">
+              <a:extLst>
+                <a:ext uri="{FF2B5EF4-FFF2-40B4-BE49-F238E27FC236}">
+                  <a16:creationId xmlns:a16="http://schemas.microsoft.com/office/drawing/2014/main" id="{2C0FF599-C231-4963-A9AF-64EDDA470E20}"/>
+                </a:ext>
+              </a:extLst>
+            </p:cNvPr>
+            <p:cNvSpPr txBox="1"/>
+            <p:nvPr/>
+          </p:nvSpPr>
+          <p:spPr>
+            <a:xfrm>
+              <a:off x="4207792" y="3127973"/>
+              <a:ext cx="1183978" cy="276999"/>
+            </a:xfrm>
+            <a:prstGeom prst="rect">
+              <a:avLst/>
+            </a:prstGeom>
+            <a:noFill/>
+          </p:spPr>
+          <p:txBody>
+            <a:bodyPr wrap="none" rtlCol="0">
+              <a:spAutoFit/>
+            </a:bodyPr>
+            <a:lstStyle/>
+            <a:p>
+              <a:r>
+                <a:rPr lang="en-US" sz="1200" dirty="0"/>
+                <a:t>Event Grid Topic</a:t>
+              </a:r>
+            </a:p>
+          </p:txBody>
+        </p:sp>
+        <p:sp>
+          <p:nvSpPr>
+            <p:cNvPr id="9" name="Rectangle 8">
+              <a:extLst>
+                <a:ext uri="{FF2B5EF4-FFF2-40B4-BE49-F238E27FC236}">
+                  <a16:creationId xmlns:a16="http://schemas.microsoft.com/office/drawing/2014/main" id="{75AA1145-E823-4AA1-B702-3F0F880A8E6B}"/>
+                </a:ext>
+              </a:extLst>
+            </p:cNvPr>
+            <p:cNvSpPr/>
+            <p:nvPr/>
+          </p:nvSpPr>
+          <p:spPr>
+            <a:xfrm>
+              <a:off x="4104783" y="3364094"/>
+              <a:ext cx="1389996" cy="276999"/>
+            </a:xfrm>
+            <a:prstGeom prst="rect">
+              <a:avLst/>
+            </a:prstGeom>
+          </p:spPr>
+          <p:txBody>
+            <a:bodyPr wrap="none">
+              <a:spAutoFit/>
+            </a:bodyPr>
+            <a:lstStyle/>
+            <a:p>
+              <a:r>
+                <a:rPr lang="en-US" sz="1200" dirty="0"/>
+                <a:t>Event Grid Schema</a:t>
+              </a:r>
+            </a:p>
+          </p:txBody>
+        </p:sp>
+      </p:grpSp>
+      <p:cxnSp>
+        <p:nvCxnSpPr>
+          <p:cNvPr id="18" name="Straight Arrow Connector 17">
+            <a:extLst>
+              <a:ext uri="{FF2B5EF4-FFF2-40B4-BE49-F238E27FC236}">
+                <a16:creationId xmlns:a16="http://schemas.microsoft.com/office/drawing/2014/main" id="{B1DAAA82-5C6C-4AE6-91D1-8CDF37CD2FFA}"/>
+              </a:ext>
+            </a:extLst>
+          </p:cNvPr>
+          <p:cNvCxnSpPr>
+            <a:cxnSpLocks/>
+            <a:stCxn id="6" idx="3"/>
+            <a:endCxn id="4" idx="1"/>
+          </p:cNvCxnSpPr>
+          <p:nvPr/>
+        </p:nvCxnSpPr>
+        <p:spPr>
+          <a:xfrm>
+            <a:off x="5329479" y="3204343"/>
+            <a:ext cx="1296990" cy="6841"/>
+          </a:xfrm>
+          <a:prstGeom prst="straightConnector1">
+            <a:avLst/>
+          </a:prstGeom>
+          <a:ln>
+            <a:tailEnd type="triangle"/>
+          </a:ln>
+        </p:spPr>
+        <p:style>
+          <a:lnRef idx="1">
+            <a:schemeClr val="accent1"/>
+          </a:lnRef>
+          <a:fillRef idx="0">
+            <a:schemeClr val="accent1"/>
+          </a:fillRef>
+          <a:effectRef idx="0">
+            <a:schemeClr val="accent1"/>
+          </a:effectRef>
+          <a:fontRef idx="minor">
+            <a:schemeClr val="tx1"/>
+          </a:fontRef>
+        </p:style>
+      </p:cxnSp>
+      <p:cxnSp>
+        <p:nvCxnSpPr>
+          <p:cNvPr id="22" name="Connector: Elbow 21">
+            <a:extLst>
+              <a:ext uri="{FF2B5EF4-FFF2-40B4-BE49-F238E27FC236}">
+                <a16:creationId xmlns:a16="http://schemas.microsoft.com/office/drawing/2014/main" id="{D21D8099-9D42-40D7-9409-F62BBC8C70BA}"/>
+              </a:ext>
+            </a:extLst>
+          </p:cNvPr>
+          <p:cNvCxnSpPr>
+            <a:stCxn id="5" idx="3"/>
+            <a:endCxn id="3" idx="0"/>
+          </p:cNvCxnSpPr>
+          <p:nvPr/>
+        </p:nvCxnSpPr>
+        <p:spPr>
+          <a:xfrm>
+            <a:off x="936421" y="2090510"/>
+            <a:ext cx="344837" cy="560520"/>
+          </a:xfrm>
+          <a:prstGeom prst="bentConnector2">
+            <a:avLst/>
+          </a:prstGeom>
+          <a:ln>
+            <a:tailEnd type="triangle"/>
+          </a:ln>
+        </p:spPr>
+        <p:style>
+          <a:lnRef idx="1">
+            <a:schemeClr val="accent1"/>
+          </a:lnRef>
+          <a:fillRef idx="0">
+            <a:schemeClr val="accent1"/>
+          </a:fillRef>
+          <a:effectRef idx="0">
+            <a:schemeClr val="accent1"/>
+          </a:effectRef>
+          <a:fontRef idx="minor">
+            <a:schemeClr val="tx1"/>
+          </a:fontRef>
+        </p:style>
+      </p:cxnSp>
       <p:pic>
         <p:nvPicPr>
-          <p:cNvPr id="10" name="Graphic 9">
+          <p:cNvPr id="23" name="Graphic 22">
             <a:extLst>
               <a:ext uri="{FF2B5EF4-FFF2-40B4-BE49-F238E27FC236}">
-                <a16:creationId xmlns:a16="http://schemas.microsoft.com/office/drawing/2014/main" id="{BC1E6E54-31CF-4C10-AECA-34383AAA6A38}"/>
+                <a16:creationId xmlns:a16="http://schemas.microsoft.com/office/drawing/2014/main" id="{FB1BB310-A22D-4828-B53D-23AA8AD960FB}"/>
               </a:ext>
             </a:extLst>
           </p:cNvPr>
@@ -6206,10 +6596,10 @@
           <p:nvPr/>
         </p:nvPicPr>
         <p:blipFill>
-          <a:blip r:embed="rId5">
+          <a:blip r:embed="rId7">
             <a:extLst>
               <a:ext uri="{96DAC541-7B7A-43D3-8B79-37D633B846F1}">
-                <asvg:svgBlip xmlns:asvg="http://schemas.microsoft.com/office/drawing/2016/SVG/main" r:embed="rId6"/>
+                <asvg:svgBlip xmlns:asvg="http://schemas.microsoft.com/office/drawing/2016/SVG/main" r:embed="rId8"/>
               </a:ext>
             </a:extLst>
           </a:blip>
@@ -6219,7 +6609,7 @@
         </p:blipFill>
         <p:spPr>
           <a:xfrm>
-            <a:off x="8963082" y="3448165"/>
+            <a:off x="6626469" y="4728742"/>
             <a:ext cx="719390" cy="719390"/>
           </a:xfrm>
           <a:prstGeom prst="rect">
@@ -6227,6 +6617,1843 @@
           </a:prstGeom>
         </p:spPr>
       </p:pic>
+      <p:sp>
+        <p:nvSpPr>
+          <p:cNvPr id="24" name="Rectangle 23">
+            <a:extLst>
+              <a:ext uri="{FF2B5EF4-FFF2-40B4-BE49-F238E27FC236}">
+                <a16:creationId xmlns:a16="http://schemas.microsoft.com/office/drawing/2014/main" id="{283C3630-206B-481E-A2D1-BB59B755B9A9}"/>
+              </a:ext>
+            </a:extLst>
+          </p:cNvPr>
+          <p:cNvSpPr/>
+          <p:nvPr/>
+        </p:nvSpPr>
+        <p:spPr>
+          <a:xfrm>
+            <a:off x="6626469" y="5499551"/>
+            <a:ext cx="4539762" cy="276999"/>
+          </a:xfrm>
+          <a:prstGeom prst="rect">
+            <a:avLst/>
+          </a:prstGeom>
+        </p:spPr>
+        <p:txBody>
+          <a:bodyPr wrap="square">
+            <a:spAutoFit/>
+          </a:bodyPr>
+          <a:lstStyle/>
+          <a:p>
+            <a:r>
+              <a:rPr lang="en-US" sz="1200" dirty="0"/>
+              <a:t>https://bet-dream-func.azurewebsites.net/api/webhook?code={code}</a:t>
+            </a:r>
+          </a:p>
+        </p:txBody>
+      </p:sp>
+      <p:cxnSp>
+        <p:nvCxnSpPr>
+          <p:cNvPr id="27" name="Connector: Elbow 26">
+            <a:extLst>
+              <a:ext uri="{FF2B5EF4-FFF2-40B4-BE49-F238E27FC236}">
+                <a16:creationId xmlns:a16="http://schemas.microsoft.com/office/drawing/2014/main" id="{9F25DB2A-126E-45F9-8462-48B77C1F69E9}"/>
+              </a:ext>
+            </a:extLst>
+          </p:cNvPr>
+          <p:cNvCxnSpPr>
+            <a:stCxn id="6" idx="3"/>
+            <a:endCxn id="23" idx="1"/>
+          </p:cNvCxnSpPr>
+          <p:nvPr/>
+        </p:nvCxnSpPr>
+        <p:spPr>
+          <a:xfrm>
+            <a:off x="5329479" y="3204343"/>
+            <a:ext cx="1296990" cy="1884094"/>
+          </a:xfrm>
+          <a:prstGeom prst="bentConnector3">
+            <a:avLst/>
+          </a:prstGeom>
+          <a:ln>
+            <a:tailEnd type="triangle"/>
+          </a:ln>
+        </p:spPr>
+        <p:style>
+          <a:lnRef idx="1">
+            <a:schemeClr val="accent1"/>
+          </a:lnRef>
+          <a:fillRef idx="0">
+            <a:schemeClr val="accent1"/>
+          </a:fillRef>
+          <a:effectRef idx="0">
+            <a:schemeClr val="accent1"/>
+          </a:effectRef>
+          <a:fontRef idx="minor">
+            <a:schemeClr val="tx1"/>
+          </a:fontRef>
+        </p:style>
+      </p:cxnSp>
+      <p:sp>
+        <p:nvSpPr>
+          <p:cNvPr id="28" name="Rectangle 27">
+            <a:extLst>
+              <a:ext uri="{FF2B5EF4-FFF2-40B4-BE49-F238E27FC236}">
+                <a16:creationId xmlns:a16="http://schemas.microsoft.com/office/drawing/2014/main" id="{6C25E297-5853-4106-84CC-4286F1E4A6E7}"/>
+              </a:ext>
+            </a:extLst>
+          </p:cNvPr>
+          <p:cNvSpPr/>
+          <p:nvPr/>
+        </p:nvSpPr>
+        <p:spPr>
+          <a:xfrm>
+            <a:off x="7345859" y="2994762"/>
+            <a:ext cx="3654014" cy="338554"/>
+          </a:xfrm>
+          <a:prstGeom prst="rect">
+            <a:avLst/>
+          </a:prstGeom>
+        </p:spPr>
+        <p:txBody>
+          <a:bodyPr wrap="none">
+            <a:spAutoFit/>
+          </a:bodyPr>
+          <a:lstStyle/>
+          <a:p>
+            <a:r>
+              <a:rPr lang="en-US" sz="1600" dirty="0" err="1"/>
+              <a:t>Bet.AspNetCore.EventGrid.WebApp.csproj</a:t>
+            </a:r>
+            <a:endParaRPr lang="en-US" sz="1600" dirty="0"/>
+          </a:p>
+        </p:txBody>
+      </p:sp>
+      <p:sp>
+        <p:nvSpPr>
+          <p:cNvPr id="29" name="Rectangle 28">
+            <a:extLst>
+              <a:ext uri="{FF2B5EF4-FFF2-40B4-BE49-F238E27FC236}">
+                <a16:creationId xmlns:a16="http://schemas.microsoft.com/office/drawing/2014/main" id="{18B8B442-4860-4D20-AC52-6FB7DAAEEAB4}"/>
+              </a:ext>
+            </a:extLst>
+          </p:cNvPr>
+          <p:cNvSpPr/>
+          <p:nvPr/>
+        </p:nvSpPr>
+        <p:spPr>
+          <a:xfrm>
+            <a:off x="7476878" y="4903771"/>
+            <a:ext cx="2398734" cy="338554"/>
+          </a:xfrm>
+          <a:prstGeom prst="rect">
+            <a:avLst/>
+          </a:prstGeom>
+        </p:spPr>
+        <p:txBody>
+          <a:bodyPr wrap="none">
+            <a:spAutoFit/>
+          </a:bodyPr>
+          <a:lstStyle/>
+          <a:p>
+            <a:r>
+              <a:rPr lang="en-US" sz="1600" dirty="0" err="1"/>
+              <a:t>Bet.AspNetCore.Func.csproj</a:t>
+            </a:r>
+            <a:endParaRPr lang="en-US" sz="1600" dirty="0"/>
+          </a:p>
+        </p:txBody>
+      </p:sp>
+      <p:sp>
+        <p:nvSpPr>
+          <p:cNvPr id="30" name="Title 29">
+            <a:extLst>
+              <a:ext uri="{FF2B5EF4-FFF2-40B4-BE49-F238E27FC236}">
+                <a16:creationId xmlns:a16="http://schemas.microsoft.com/office/drawing/2014/main" id="{25F0A6CB-D045-4D4B-8543-61958F763040}"/>
+              </a:ext>
+            </a:extLst>
+          </p:cNvPr>
+          <p:cNvSpPr>
+            <a:spLocks noGrp="1"/>
+          </p:cNvSpPr>
+          <p:nvPr>
+            <p:ph type="title"/>
+          </p:nvPr>
+        </p:nvSpPr>
+        <p:spPr>
+          <a:xfrm>
+            <a:off x="913774" y="188879"/>
+            <a:ext cx="10364451" cy="1596177"/>
+          </a:xfrm>
+        </p:spPr>
+        <p:txBody>
+          <a:bodyPr/>
+          <a:lstStyle/>
+          <a:p>
+            <a:r>
+              <a:rPr lang="en-US" dirty="0"/>
+              <a:t>Event grid Schema</a:t>
+            </a:r>
+          </a:p>
+        </p:txBody>
+      </p:sp>
+      <p:sp>
+        <p:nvSpPr>
+          <p:cNvPr id="31" name="Rectangle 30">
+            <a:extLst>
+              <a:ext uri="{FF2B5EF4-FFF2-40B4-BE49-F238E27FC236}">
+                <a16:creationId xmlns:a16="http://schemas.microsoft.com/office/drawing/2014/main" id="{35A816A1-0B40-423C-BBD3-4F0CFA815965}"/>
+              </a:ext>
+            </a:extLst>
+          </p:cNvPr>
+          <p:cNvSpPr/>
+          <p:nvPr/>
+        </p:nvSpPr>
+        <p:spPr>
+          <a:xfrm>
+            <a:off x="4274786" y="2450205"/>
+            <a:ext cx="1406154" cy="369332"/>
+          </a:xfrm>
+          <a:prstGeom prst="rect">
+            <a:avLst/>
+          </a:prstGeom>
+        </p:spPr>
+        <p:txBody>
+          <a:bodyPr wrap="none">
+            <a:spAutoFit/>
+          </a:bodyPr>
+          <a:lstStyle/>
+          <a:p>
+            <a:r>
+              <a:rPr lang="en-US" dirty="0"/>
+              <a:t>bet-</a:t>
+            </a:r>
+            <a:r>
+              <a:rPr lang="en-US" dirty="0" err="1"/>
+              <a:t>egs</a:t>
+            </a:r>
+            <a:r>
+              <a:rPr lang="en-US" dirty="0"/>
+              <a:t>-topic</a:t>
+            </a:r>
+          </a:p>
+        </p:txBody>
+      </p:sp>
+      <p:sp>
+        <p:nvSpPr>
+          <p:cNvPr id="32" name="Rectangle 31">
+            <a:extLst>
+              <a:ext uri="{FF2B5EF4-FFF2-40B4-BE49-F238E27FC236}">
+                <a16:creationId xmlns:a16="http://schemas.microsoft.com/office/drawing/2014/main" id="{39B68F55-984C-4FE8-8E08-A165D867EE6D}"/>
+              </a:ext>
+            </a:extLst>
+          </p:cNvPr>
+          <p:cNvSpPr/>
+          <p:nvPr/>
+        </p:nvSpPr>
+        <p:spPr>
+          <a:xfrm>
+            <a:off x="1064008" y="1651245"/>
+            <a:ext cx="1714014" cy="615553"/>
+          </a:xfrm>
+          <a:prstGeom prst="rect">
+            <a:avLst/>
+          </a:prstGeom>
+        </p:spPr>
+        <p:txBody>
+          <a:bodyPr wrap="square">
+            <a:spAutoFit/>
+          </a:bodyPr>
+          <a:lstStyle/>
+          <a:p>
+            <a:r>
+              <a:rPr lang="en-US" dirty="0"/>
+              <a:t> </a:t>
+            </a:r>
+            <a:r>
+              <a:rPr lang="en-US" sz="1600" dirty="0"/>
+              <a:t>"Endpoint": "",</a:t>
+            </a:r>
+          </a:p>
+          <a:p>
+            <a:r>
+              <a:rPr lang="en-US" sz="1600" dirty="0"/>
+              <a:t>    "Key": ""</a:t>
+            </a:r>
+          </a:p>
+        </p:txBody>
+      </p:sp>
+    </p:spTree>
+    <p:extLst>
+      <p:ext uri="{BB962C8B-B14F-4D97-AF65-F5344CB8AC3E}">
+        <p14:creationId xmlns:p14="http://schemas.microsoft.com/office/powerpoint/2010/main" val="4247992962"/>
+      </p:ext>
+    </p:extLst>
+  </p:cSld>
+  <p:clrMapOvr>
+    <a:masterClrMapping/>
+  </p:clrMapOvr>
+</p:sld>
+</file>
+
+<file path=ppt/slides/slide3.xml><?xml version="1.0" encoding="utf-8"?>
+<p:sld xmlns:a="http://schemas.openxmlformats.org/drawingml/2006/main" xmlns:r="http://schemas.openxmlformats.org/officeDocument/2006/relationships" xmlns:p="http://schemas.openxmlformats.org/presentationml/2006/main">
+  <p:cSld>
+    <p:spTree>
+      <p:nvGrpSpPr>
+        <p:cNvPr id="1" name=""/>
+        <p:cNvGrpSpPr/>
+        <p:nvPr/>
+      </p:nvGrpSpPr>
+      <p:grpSpPr>
+        <a:xfrm>
+          <a:off x="0" y="0"/>
+          <a:ext cx="0" cy="0"/>
+          <a:chOff x="0" y="0"/>
+          <a:chExt cx="0" cy="0"/>
+        </a:xfrm>
+      </p:grpSpPr>
+      <p:pic>
+        <p:nvPicPr>
+          <p:cNvPr id="4" name="Picture 3">
+            <a:extLst>
+              <a:ext uri="{FF2B5EF4-FFF2-40B4-BE49-F238E27FC236}">
+                <a16:creationId xmlns:a16="http://schemas.microsoft.com/office/drawing/2014/main" id="{B77FD5D5-C5BB-471D-9DD3-558649C20F3C}"/>
+              </a:ext>
+            </a:extLst>
+          </p:cNvPr>
+          <p:cNvPicPr>
+            <a:picLocks noChangeAspect="1"/>
+          </p:cNvPicPr>
+          <p:nvPr/>
+        </p:nvPicPr>
+        <p:blipFill>
+          <a:blip r:embed="rId2"/>
+          <a:stretch>
+            <a:fillRect/>
+          </a:stretch>
+        </p:blipFill>
+        <p:spPr>
+          <a:xfrm>
+            <a:off x="6626469" y="2851489"/>
+            <a:ext cx="719390" cy="719390"/>
+          </a:xfrm>
+          <a:prstGeom prst="rect">
+            <a:avLst/>
+          </a:prstGeom>
+        </p:spPr>
+      </p:pic>
+      <p:pic>
+        <p:nvPicPr>
+          <p:cNvPr id="5" name="Graphic 4">
+            <a:extLst>
+              <a:ext uri="{FF2B5EF4-FFF2-40B4-BE49-F238E27FC236}">
+                <a16:creationId xmlns:a16="http://schemas.microsoft.com/office/drawing/2014/main" id="{3B341D1C-355A-4BAB-A45C-A83E33CE0946}"/>
+              </a:ext>
+            </a:extLst>
+          </p:cNvPr>
+          <p:cNvPicPr>
+            <a:picLocks noChangeAspect="1"/>
+          </p:cNvPicPr>
+          <p:nvPr/>
+        </p:nvPicPr>
+        <p:blipFill>
+          <a:blip r:embed="rId3">
+            <a:extLst>
+              <a:ext uri="{96DAC541-7B7A-43D3-8B79-37D633B846F1}">
+                <asvg:svgBlip xmlns:asvg="http://schemas.microsoft.com/office/drawing/2016/SVG/main" r:embed="rId4"/>
+              </a:ext>
+            </a:extLst>
+          </a:blip>
+          <a:stretch>
+            <a:fillRect/>
+          </a:stretch>
+        </p:blipFill>
+        <p:spPr>
+          <a:xfrm>
+            <a:off x="217031" y="1730815"/>
+            <a:ext cx="719390" cy="719390"/>
+          </a:xfrm>
+          <a:prstGeom prst="rect">
+            <a:avLst/>
+          </a:prstGeom>
+        </p:spPr>
+      </p:pic>
+      <p:sp>
+        <p:nvSpPr>
+          <p:cNvPr id="8" name="Rectangle 7">
+            <a:extLst>
+              <a:ext uri="{FF2B5EF4-FFF2-40B4-BE49-F238E27FC236}">
+                <a16:creationId xmlns:a16="http://schemas.microsoft.com/office/drawing/2014/main" id="{C9889E78-07FD-4FD2-A82A-3656E3DD2D95}"/>
+              </a:ext>
+            </a:extLst>
+          </p:cNvPr>
+          <p:cNvSpPr/>
+          <p:nvPr/>
+        </p:nvSpPr>
+        <p:spPr>
+          <a:xfrm>
+            <a:off x="6626469" y="3668465"/>
+            <a:ext cx="3280963" cy="276999"/>
+          </a:xfrm>
+          <a:prstGeom prst="rect">
+            <a:avLst/>
+          </a:prstGeom>
+        </p:spPr>
+        <p:txBody>
+          <a:bodyPr wrap="none">
+            <a:spAutoFit/>
+          </a:bodyPr>
+          <a:lstStyle/>
+          <a:p>
+            <a:r>
+              <a:rPr lang="en-US" sz="1200" dirty="0"/>
+              <a:t>https://bet-eventgrid.azurewebsites.net/webhooks</a:t>
+            </a:r>
+          </a:p>
+        </p:txBody>
+      </p:sp>
+      <p:sp>
+        <p:nvSpPr>
+          <p:cNvPr id="3" name="Rectangle 2">
+            <a:extLst>
+              <a:ext uri="{FF2B5EF4-FFF2-40B4-BE49-F238E27FC236}">
+                <a16:creationId xmlns:a16="http://schemas.microsoft.com/office/drawing/2014/main" id="{845FAB11-C685-439C-B194-B1FF170364AF}"/>
+              </a:ext>
+            </a:extLst>
+          </p:cNvPr>
+          <p:cNvSpPr/>
+          <p:nvPr/>
+        </p:nvSpPr>
+        <p:spPr>
+          <a:xfrm>
+            <a:off x="615906" y="2651030"/>
+            <a:ext cx="1330704" cy="1426128"/>
+          </a:xfrm>
+          <a:prstGeom prst="rect">
+            <a:avLst/>
+          </a:prstGeom>
+          <a:solidFill>
+            <a:schemeClr val="tx2">
+              <a:lumMod val="40000"/>
+              <a:lumOff val="60000"/>
+            </a:schemeClr>
+          </a:solidFill>
+        </p:spPr>
+        <p:style>
+          <a:lnRef idx="2">
+            <a:schemeClr val="accent1">
+              <a:shade val="50000"/>
+            </a:schemeClr>
+          </a:lnRef>
+          <a:fillRef idx="1">
+            <a:schemeClr val="accent1"/>
+          </a:fillRef>
+          <a:effectRef idx="0">
+            <a:schemeClr val="accent1"/>
+          </a:effectRef>
+          <a:fontRef idx="minor">
+            <a:schemeClr val="lt1"/>
+          </a:fontRef>
+        </p:style>
+        <p:txBody>
+          <a:bodyPr rtlCol="0" anchor="ctr"/>
+          <a:lstStyle/>
+          <a:p>
+            <a:pPr algn="ctr"/>
+            <a:r>
+              <a:rPr lang="en-US" dirty="0"/>
+              <a:t>Broadcaster App</a:t>
+            </a:r>
+          </a:p>
+        </p:txBody>
+      </p:sp>
+      <p:sp>
+        <p:nvSpPr>
+          <p:cNvPr id="11" name="Rectangle 10">
+            <a:extLst>
+              <a:ext uri="{FF2B5EF4-FFF2-40B4-BE49-F238E27FC236}">
+                <a16:creationId xmlns:a16="http://schemas.microsoft.com/office/drawing/2014/main" id="{02EA3AD8-D016-4D06-9080-53E6F6EEA7E8}"/>
+              </a:ext>
+            </a:extLst>
+          </p:cNvPr>
+          <p:cNvSpPr/>
+          <p:nvPr/>
+        </p:nvSpPr>
+        <p:spPr>
+          <a:xfrm>
+            <a:off x="6626469" y="4077158"/>
+            <a:ext cx="3540777" cy="276999"/>
+          </a:xfrm>
+          <a:prstGeom prst="rect">
+            <a:avLst/>
+          </a:prstGeom>
+        </p:spPr>
+        <p:txBody>
+          <a:bodyPr wrap="none">
+            <a:spAutoFit/>
+          </a:bodyPr>
+          <a:lstStyle/>
+          <a:p>
+            <a:r>
+              <a:rPr lang="en-US" sz="1200" dirty="0"/>
+              <a:t>https://bet-eventgrid.azurewebsites.net/events/viewer</a:t>
+            </a:r>
+          </a:p>
+        </p:txBody>
+      </p:sp>
+      <p:cxnSp>
+        <p:nvCxnSpPr>
+          <p:cNvPr id="12" name="Straight Arrow Connector 11">
+            <a:extLst>
+              <a:ext uri="{FF2B5EF4-FFF2-40B4-BE49-F238E27FC236}">
+                <a16:creationId xmlns:a16="http://schemas.microsoft.com/office/drawing/2014/main" id="{57C44BA0-1471-47F0-95EF-92EFB1DFD6C6}"/>
+              </a:ext>
+            </a:extLst>
+          </p:cNvPr>
+          <p:cNvCxnSpPr>
+            <a:cxnSpLocks/>
+            <a:stCxn id="3" idx="3"/>
+          </p:cNvCxnSpPr>
+          <p:nvPr/>
+        </p:nvCxnSpPr>
+        <p:spPr>
+          <a:xfrm>
+            <a:off x="1946610" y="3364094"/>
+            <a:ext cx="2328176" cy="16683"/>
+          </a:xfrm>
+          <a:prstGeom prst="straightConnector1">
+            <a:avLst/>
+          </a:prstGeom>
+          <a:ln>
+            <a:tailEnd type="triangle"/>
+          </a:ln>
+        </p:spPr>
+        <p:style>
+          <a:lnRef idx="1">
+            <a:schemeClr val="accent1"/>
+          </a:lnRef>
+          <a:fillRef idx="0">
+            <a:schemeClr val="accent1"/>
+          </a:fillRef>
+          <a:effectRef idx="0">
+            <a:schemeClr val="accent1"/>
+          </a:effectRef>
+          <a:fontRef idx="minor">
+            <a:schemeClr val="tx1"/>
+          </a:fontRef>
+        </p:style>
+      </p:cxnSp>
+      <p:grpSp>
+        <p:nvGrpSpPr>
+          <p:cNvPr id="13" name="Group 12">
+            <a:extLst>
+              <a:ext uri="{FF2B5EF4-FFF2-40B4-BE49-F238E27FC236}">
+                <a16:creationId xmlns:a16="http://schemas.microsoft.com/office/drawing/2014/main" id="{D10047D3-5B0C-4941-A8CE-86FA0CF075B1}"/>
+              </a:ext>
+            </a:extLst>
+          </p:cNvPr>
+          <p:cNvGrpSpPr/>
+          <p:nvPr/>
+        </p:nvGrpSpPr>
+        <p:grpSpPr>
+          <a:xfrm>
+            <a:off x="4274786" y="2844648"/>
+            <a:ext cx="1415644" cy="1232510"/>
+            <a:chOff x="4104783" y="2408583"/>
+            <a:chExt cx="1415644" cy="1232510"/>
+          </a:xfrm>
+        </p:grpSpPr>
+        <p:pic>
+          <p:nvPicPr>
+            <p:cNvPr id="6" name="Graphic 5">
+              <a:extLst>
+                <a:ext uri="{FF2B5EF4-FFF2-40B4-BE49-F238E27FC236}">
+                  <a16:creationId xmlns:a16="http://schemas.microsoft.com/office/drawing/2014/main" id="{60A0F9FF-A627-4D3E-92C3-233670729A3D}"/>
+                </a:ext>
+              </a:extLst>
+            </p:cNvPr>
+            <p:cNvPicPr>
+              <a:picLocks noChangeAspect="1"/>
+            </p:cNvPicPr>
+            <p:nvPr/>
+          </p:nvPicPr>
+          <p:blipFill>
+            <a:blip r:embed="rId5">
+              <a:extLst>
+                <a:ext uri="{96DAC541-7B7A-43D3-8B79-37D633B846F1}">
+                  <asvg:svgBlip xmlns:asvg="http://schemas.microsoft.com/office/drawing/2016/SVG/main" r:embed="rId6"/>
+                </a:ext>
+              </a:extLst>
+            </a:blip>
+            <a:stretch>
+              <a:fillRect/>
+            </a:stretch>
+          </p:blipFill>
+          <p:spPr>
+            <a:xfrm>
+              <a:off x="4440086" y="2408583"/>
+              <a:ext cx="719390" cy="719390"/>
+            </a:xfrm>
+            <a:prstGeom prst="rect">
+              <a:avLst/>
+            </a:prstGeom>
+          </p:spPr>
+        </p:pic>
+        <p:sp>
+          <p:nvSpPr>
+            <p:cNvPr id="2" name="TextBox 1">
+              <a:extLst>
+                <a:ext uri="{FF2B5EF4-FFF2-40B4-BE49-F238E27FC236}">
+                  <a16:creationId xmlns:a16="http://schemas.microsoft.com/office/drawing/2014/main" id="{2C0FF599-C231-4963-A9AF-64EDDA470E20}"/>
+                </a:ext>
+              </a:extLst>
+            </p:cNvPr>
+            <p:cNvSpPr txBox="1"/>
+            <p:nvPr/>
+          </p:nvSpPr>
+          <p:spPr>
+            <a:xfrm>
+              <a:off x="4207792" y="3127973"/>
+              <a:ext cx="1183978" cy="276999"/>
+            </a:xfrm>
+            <a:prstGeom prst="rect">
+              <a:avLst/>
+            </a:prstGeom>
+            <a:noFill/>
+          </p:spPr>
+          <p:txBody>
+            <a:bodyPr wrap="none" rtlCol="0">
+              <a:spAutoFit/>
+            </a:bodyPr>
+            <a:lstStyle/>
+            <a:p>
+              <a:r>
+                <a:rPr lang="en-US" sz="1200" dirty="0"/>
+                <a:t>Event Grid Topic</a:t>
+              </a:r>
+            </a:p>
+          </p:txBody>
+        </p:sp>
+        <p:sp>
+          <p:nvSpPr>
+            <p:cNvPr id="9" name="Rectangle 8">
+              <a:extLst>
+                <a:ext uri="{FF2B5EF4-FFF2-40B4-BE49-F238E27FC236}">
+                  <a16:creationId xmlns:a16="http://schemas.microsoft.com/office/drawing/2014/main" id="{75AA1145-E823-4AA1-B702-3F0F880A8E6B}"/>
+                </a:ext>
+              </a:extLst>
+            </p:cNvPr>
+            <p:cNvSpPr/>
+            <p:nvPr/>
+          </p:nvSpPr>
+          <p:spPr>
+            <a:xfrm>
+              <a:off x="4104783" y="3364094"/>
+              <a:ext cx="1415644" cy="276999"/>
+            </a:xfrm>
+            <a:prstGeom prst="rect">
+              <a:avLst/>
+            </a:prstGeom>
+          </p:spPr>
+          <p:txBody>
+            <a:bodyPr wrap="none">
+              <a:spAutoFit/>
+            </a:bodyPr>
+            <a:lstStyle/>
+            <a:p>
+              <a:r>
+                <a:rPr lang="en-US" sz="1200" dirty="0"/>
+                <a:t>Cloud Event Schema</a:t>
+              </a:r>
+            </a:p>
+          </p:txBody>
+        </p:sp>
+      </p:grpSp>
+      <p:cxnSp>
+        <p:nvCxnSpPr>
+          <p:cNvPr id="18" name="Straight Arrow Connector 17">
+            <a:extLst>
+              <a:ext uri="{FF2B5EF4-FFF2-40B4-BE49-F238E27FC236}">
+                <a16:creationId xmlns:a16="http://schemas.microsoft.com/office/drawing/2014/main" id="{B1DAAA82-5C6C-4AE6-91D1-8CDF37CD2FFA}"/>
+              </a:ext>
+            </a:extLst>
+          </p:cNvPr>
+          <p:cNvCxnSpPr>
+            <a:cxnSpLocks/>
+            <a:stCxn id="6" idx="3"/>
+            <a:endCxn id="4" idx="1"/>
+          </p:cNvCxnSpPr>
+          <p:nvPr/>
+        </p:nvCxnSpPr>
+        <p:spPr>
+          <a:xfrm>
+            <a:off x="5329479" y="3204343"/>
+            <a:ext cx="1296990" cy="6841"/>
+          </a:xfrm>
+          <a:prstGeom prst="straightConnector1">
+            <a:avLst/>
+          </a:prstGeom>
+          <a:ln>
+            <a:tailEnd type="triangle"/>
+          </a:ln>
+        </p:spPr>
+        <p:style>
+          <a:lnRef idx="1">
+            <a:schemeClr val="accent1"/>
+          </a:lnRef>
+          <a:fillRef idx="0">
+            <a:schemeClr val="accent1"/>
+          </a:fillRef>
+          <a:effectRef idx="0">
+            <a:schemeClr val="accent1"/>
+          </a:effectRef>
+          <a:fontRef idx="minor">
+            <a:schemeClr val="tx1"/>
+          </a:fontRef>
+        </p:style>
+      </p:cxnSp>
+      <p:cxnSp>
+        <p:nvCxnSpPr>
+          <p:cNvPr id="22" name="Connector: Elbow 21">
+            <a:extLst>
+              <a:ext uri="{FF2B5EF4-FFF2-40B4-BE49-F238E27FC236}">
+                <a16:creationId xmlns:a16="http://schemas.microsoft.com/office/drawing/2014/main" id="{D21D8099-9D42-40D7-9409-F62BBC8C70BA}"/>
+              </a:ext>
+            </a:extLst>
+          </p:cNvPr>
+          <p:cNvCxnSpPr>
+            <a:stCxn id="5" idx="3"/>
+            <a:endCxn id="3" idx="0"/>
+          </p:cNvCxnSpPr>
+          <p:nvPr/>
+        </p:nvCxnSpPr>
+        <p:spPr>
+          <a:xfrm>
+            <a:off x="936421" y="2090510"/>
+            <a:ext cx="344837" cy="560520"/>
+          </a:xfrm>
+          <a:prstGeom prst="bentConnector2">
+            <a:avLst/>
+          </a:prstGeom>
+          <a:ln>
+            <a:tailEnd type="triangle"/>
+          </a:ln>
+        </p:spPr>
+        <p:style>
+          <a:lnRef idx="1">
+            <a:schemeClr val="accent1"/>
+          </a:lnRef>
+          <a:fillRef idx="0">
+            <a:schemeClr val="accent1"/>
+          </a:fillRef>
+          <a:effectRef idx="0">
+            <a:schemeClr val="accent1"/>
+          </a:effectRef>
+          <a:fontRef idx="minor">
+            <a:schemeClr val="tx1"/>
+          </a:fontRef>
+        </p:style>
+      </p:cxnSp>
+      <p:sp>
+        <p:nvSpPr>
+          <p:cNvPr id="28" name="Rectangle 27">
+            <a:extLst>
+              <a:ext uri="{FF2B5EF4-FFF2-40B4-BE49-F238E27FC236}">
+                <a16:creationId xmlns:a16="http://schemas.microsoft.com/office/drawing/2014/main" id="{6C25E297-5853-4106-84CC-4286F1E4A6E7}"/>
+              </a:ext>
+            </a:extLst>
+          </p:cNvPr>
+          <p:cNvSpPr/>
+          <p:nvPr/>
+        </p:nvSpPr>
+        <p:spPr>
+          <a:xfrm>
+            <a:off x="7345859" y="2994762"/>
+            <a:ext cx="3654014" cy="338554"/>
+          </a:xfrm>
+          <a:prstGeom prst="rect">
+            <a:avLst/>
+          </a:prstGeom>
+        </p:spPr>
+        <p:txBody>
+          <a:bodyPr wrap="none">
+            <a:spAutoFit/>
+          </a:bodyPr>
+          <a:lstStyle/>
+          <a:p>
+            <a:r>
+              <a:rPr lang="en-US" sz="1600" dirty="0" err="1"/>
+              <a:t>Bet.AspNetCore.EventGrid.WebApp.csproj</a:t>
+            </a:r>
+            <a:endParaRPr lang="en-US" sz="1600" dirty="0"/>
+          </a:p>
+        </p:txBody>
+      </p:sp>
+      <p:sp>
+        <p:nvSpPr>
+          <p:cNvPr id="30" name="Title 29">
+            <a:extLst>
+              <a:ext uri="{FF2B5EF4-FFF2-40B4-BE49-F238E27FC236}">
+                <a16:creationId xmlns:a16="http://schemas.microsoft.com/office/drawing/2014/main" id="{25F0A6CB-D045-4D4B-8543-61958F763040}"/>
+              </a:ext>
+            </a:extLst>
+          </p:cNvPr>
+          <p:cNvSpPr>
+            <a:spLocks noGrp="1"/>
+          </p:cNvSpPr>
+          <p:nvPr>
+            <p:ph type="title"/>
+          </p:nvPr>
+        </p:nvSpPr>
+        <p:spPr>
+          <a:xfrm>
+            <a:off x="913774" y="188879"/>
+            <a:ext cx="10364451" cy="1596177"/>
+          </a:xfrm>
+        </p:spPr>
+        <p:txBody>
+          <a:bodyPr/>
+          <a:lstStyle/>
+          <a:p>
+            <a:r>
+              <a:rPr lang="en-US" dirty="0"/>
+              <a:t>Cloud Event Schema</a:t>
+            </a:r>
+          </a:p>
+        </p:txBody>
+      </p:sp>
+      <p:sp>
+        <p:nvSpPr>
+          <p:cNvPr id="31" name="Rectangle 30">
+            <a:extLst>
+              <a:ext uri="{FF2B5EF4-FFF2-40B4-BE49-F238E27FC236}">
+                <a16:creationId xmlns:a16="http://schemas.microsoft.com/office/drawing/2014/main" id="{35A816A1-0B40-423C-BBD3-4F0CFA815965}"/>
+              </a:ext>
+            </a:extLst>
+          </p:cNvPr>
+          <p:cNvSpPr/>
+          <p:nvPr/>
+        </p:nvSpPr>
+        <p:spPr>
+          <a:xfrm>
+            <a:off x="4274786" y="2450205"/>
+            <a:ext cx="1406154" cy="369332"/>
+          </a:xfrm>
+          <a:prstGeom prst="rect">
+            <a:avLst/>
+          </a:prstGeom>
+        </p:spPr>
+        <p:txBody>
+          <a:bodyPr wrap="none">
+            <a:spAutoFit/>
+          </a:bodyPr>
+          <a:lstStyle/>
+          <a:p>
+            <a:r>
+              <a:rPr lang="en-US" dirty="0"/>
+              <a:t>bet-</a:t>
+            </a:r>
+            <a:r>
+              <a:rPr lang="en-US" dirty="0" err="1"/>
+              <a:t>ces</a:t>
+            </a:r>
+            <a:r>
+              <a:rPr lang="en-US" dirty="0"/>
+              <a:t>-topic</a:t>
+            </a:r>
+          </a:p>
+        </p:txBody>
+      </p:sp>
+      <p:sp>
+        <p:nvSpPr>
+          <p:cNvPr id="32" name="Rectangle 31">
+            <a:extLst>
+              <a:ext uri="{FF2B5EF4-FFF2-40B4-BE49-F238E27FC236}">
+                <a16:creationId xmlns:a16="http://schemas.microsoft.com/office/drawing/2014/main" id="{39B68F55-984C-4FE8-8E08-A165D867EE6D}"/>
+              </a:ext>
+            </a:extLst>
+          </p:cNvPr>
+          <p:cNvSpPr/>
+          <p:nvPr/>
+        </p:nvSpPr>
+        <p:spPr>
+          <a:xfrm>
+            <a:off x="1064008" y="1651245"/>
+            <a:ext cx="1714014" cy="615553"/>
+          </a:xfrm>
+          <a:prstGeom prst="rect">
+            <a:avLst/>
+          </a:prstGeom>
+        </p:spPr>
+        <p:txBody>
+          <a:bodyPr wrap="square">
+            <a:spAutoFit/>
+          </a:bodyPr>
+          <a:lstStyle/>
+          <a:p>
+            <a:r>
+              <a:rPr lang="en-US" dirty="0"/>
+              <a:t> </a:t>
+            </a:r>
+            <a:r>
+              <a:rPr lang="en-US" sz="1600" dirty="0"/>
+              <a:t>"Endpoint": "",</a:t>
+            </a:r>
+          </a:p>
+          <a:p>
+            <a:r>
+              <a:rPr lang="en-US" sz="1600" dirty="0"/>
+              <a:t>    "Key": ""</a:t>
+            </a:r>
+          </a:p>
+        </p:txBody>
+      </p:sp>
+    </p:spTree>
+    <p:extLst>
+      <p:ext uri="{BB962C8B-B14F-4D97-AF65-F5344CB8AC3E}">
+        <p14:creationId xmlns:p14="http://schemas.microsoft.com/office/powerpoint/2010/main" val="1035139242"/>
+      </p:ext>
+    </p:extLst>
+  </p:cSld>
+  <p:clrMapOvr>
+    <a:masterClrMapping/>
+  </p:clrMapOvr>
+</p:sld>
+</file>
+
+<file path=ppt/slides/slide4.xml><?xml version="1.0" encoding="utf-8"?>
+<p:sld xmlns:a="http://schemas.openxmlformats.org/drawingml/2006/main" xmlns:r="http://schemas.openxmlformats.org/officeDocument/2006/relationships" xmlns:p="http://schemas.openxmlformats.org/presentationml/2006/main">
+  <p:cSld>
+    <p:spTree>
+      <p:nvGrpSpPr>
+        <p:cNvPr id="1" name=""/>
+        <p:cNvGrpSpPr/>
+        <p:nvPr/>
+      </p:nvGrpSpPr>
+      <p:grpSpPr>
+        <a:xfrm>
+          <a:off x="0" y="0"/>
+          <a:ext cx="0" cy="0"/>
+          <a:chOff x="0" y="0"/>
+          <a:chExt cx="0" cy="0"/>
+        </a:xfrm>
+      </p:grpSpPr>
+      <p:pic>
+        <p:nvPicPr>
+          <p:cNvPr id="4" name="Picture 3">
+            <a:extLst>
+              <a:ext uri="{FF2B5EF4-FFF2-40B4-BE49-F238E27FC236}">
+                <a16:creationId xmlns:a16="http://schemas.microsoft.com/office/drawing/2014/main" id="{B77FD5D5-C5BB-471D-9DD3-558649C20F3C}"/>
+              </a:ext>
+            </a:extLst>
+          </p:cNvPr>
+          <p:cNvPicPr>
+            <a:picLocks noChangeAspect="1"/>
+          </p:cNvPicPr>
+          <p:nvPr/>
+        </p:nvPicPr>
+        <p:blipFill>
+          <a:blip r:embed="rId2"/>
+          <a:stretch>
+            <a:fillRect/>
+          </a:stretch>
+        </p:blipFill>
+        <p:spPr>
+          <a:xfrm>
+            <a:off x="673977" y="5182923"/>
+            <a:ext cx="719390" cy="719390"/>
+          </a:xfrm>
+          <a:prstGeom prst="rect">
+            <a:avLst/>
+          </a:prstGeom>
+        </p:spPr>
+      </p:pic>
+      <p:pic>
+        <p:nvPicPr>
+          <p:cNvPr id="5" name="Picture 6" descr="https://github.com/kubernetes/community/raw/master/icons/png/resources/labeled/ns-128.png">
+            <a:extLst>
+              <a:ext uri="{FF2B5EF4-FFF2-40B4-BE49-F238E27FC236}">
+                <a16:creationId xmlns:a16="http://schemas.microsoft.com/office/drawing/2014/main" id="{D32C4016-71CB-43A7-9A6F-EBCFCD33C1CE}"/>
+              </a:ext>
+            </a:extLst>
+          </p:cNvPr>
+          <p:cNvPicPr>
+            <a:picLocks noChangeAspect="1" noChangeArrowheads="1"/>
+          </p:cNvPicPr>
+          <p:nvPr/>
+        </p:nvPicPr>
+        <p:blipFill>
+          <a:blip r:embed="rId3">
+            <a:extLst>
+              <a:ext uri="{28A0092B-C50C-407E-A947-70E740481C1C}">
+                <a14:useLocalDpi xmlns:a14="http://schemas.microsoft.com/office/drawing/2010/main" val="0"/>
+              </a:ext>
+            </a:extLst>
+          </a:blip>
+          <a:srcRect/>
+          <a:stretch>
+            <a:fillRect/>
+          </a:stretch>
+        </p:blipFill>
+        <p:spPr bwMode="auto">
+          <a:xfrm>
+            <a:off x="22289" y="982515"/>
+            <a:ext cx="1219200" cy="1219200"/>
+          </a:xfrm>
+          <a:prstGeom prst="rect">
+            <a:avLst/>
+          </a:prstGeom>
+          <a:noFill/>
+          <a:extLst>
+            <a:ext uri="{909E8E84-426E-40DD-AFC4-6F175D3DCCD1}">
+              <a14:hiddenFill xmlns:a14="http://schemas.microsoft.com/office/drawing/2010/main">
+                <a:solidFill>
+                  <a:srgbClr val="FFFFFF"/>
+                </a:solidFill>
+              </a14:hiddenFill>
+            </a:ext>
+          </a:extLst>
+        </p:spPr>
+      </p:pic>
+      <p:pic>
+        <p:nvPicPr>
+          <p:cNvPr id="7" name="Picture 10" descr="https://github.com/kubernetes/community/raw/master/icons/png/resources/labeled/svc-128.png">
+            <a:extLst>
+              <a:ext uri="{FF2B5EF4-FFF2-40B4-BE49-F238E27FC236}">
+                <a16:creationId xmlns:a16="http://schemas.microsoft.com/office/drawing/2014/main" id="{5ADF23F4-08EE-4047-BCBF-C885B8750A25}"/>
+              </a:ext>
+            </a:extLst>
+          </p:cNvPr>
+          <p:cNvPicPr>
+            <a:picLocks noChangeAspect="1" noChangeArrowheads="1"/>
+          </p:cNvPicPr>
+          <p:nvPr/>
+        </p:nvPicPr>
+        <p:blipFill>
+          <a:blip r:embed="rId4">
+            <a:extLst>
+              <a:ext uri="{28A0092B-C50C-407E-A947-70E740481C1C}">
+                <a14:useLocalDpi xmlns:a14="http://schemas.microsoft.com/office/drawing/2010/main" val="0"/>
+              </a:ext>
+            </a:extLst>
+          </a:blip>
+          <a:srcRect/>
+          <a:stretch>
+            <a:fillRect/>
+          </a:stretch>
+        </p:blipFill>
+        <p:spPr bwMode="auto">
+          <a:xfrm>
+            <a:off x="1850328" y="3452037"/>
+            <a:ext cx="1219200" cy="1219200"/>
+          </a:xfrm>
+          <a:prstGeom prst="rect">
+            <a:avLst/>
+          </a:prstGeom>
+          <a:noFill/>
+          <a:extLst>
+            <a:ext uri="{909E8E84-426E-40DD-AFC4-6F175D3DCCD1}">
+              <a14:hiddenFill xmlns:a14="http://schemas.microsoft.com/office/drawing/2010/main">
+                <a:solidFill>
+                  <a:srgbClr val="FFFFFF"/>
+                </a:solidFill>
+              </a14:hiddenFill>
+            </a:ext>
+          </a:extLst>
+        </p:spPr>
+      </p:pic>
+      <p:pic>
+        <p:nvPicPr>
+          <p:cNvPr id="8" name="Picture 4" descr="pod-128.png">
+            <a:extLst>
+              <a:ext uri="{FF2B5EF4-FFF2-40B4-BE49-F238E27FC236}">
+                <a16:creationId xmlns:a16="http://schemas.microsoft.com/office/drawing/2014/main" id="{EEB8B7C2-A3BE-4C86-A789-8AD930E52617}"/>
+              </a:ext>
+            </a:extLst>
+          </p:cNvPr>
+          <p:cNvPicPr>
+            <a:picLocks noChangeAspect="1" noChangeArrowheads="1"/>
+          </p:cNvPicPr>
+          <p:nvPr/>
+        </p:nvPicPr>
+        <p:blipFill>
+          <a:blip r:embed="rId5">
+            <a:extLst>
+              <a:ext uri="{28A0092B-C50C-407E-A947-70E740481C1C}">
+                <a14:useLocalDpi xmlns:a14="http://schemas.microsoft.com/office/drawing/2010/main" val="0"/>
+              </a:ext>
+            </a:extLst>
+          </a:blip>
+          <a:srcRect/>
+          <a:stretch>
+            <a:fillRect/>
+          </a:stretch>
+        </p:blipFill>
+        <p:spPr bwMode="auto">
+          <a:xfrm>
+            <a:off x="3276457" y="3452037"/>
+            <a:ext cx="1219200" cy="1219200"/>
+          </a:xfrm>
+          <a:prstGeom prst="rect">
+            <a:avLst/>
+          </a:prstGeom>
+          <a:noFill/>
+          <a:extLst>
+            <a:ext uri="{909E8E84-426E-40DD-AFC4-6F175D3DCCD1}">
+              <a14:hiddenFill xmlns:a14="http://schemas.microsoft.com/office/drawing/2010/main">
+                <a:solidFill>
+                  <a:srgbClr val="FFFFFF"/>
+                </a:solidFill>
+              </a14:hiddenFill>
+            </a:ext>
+          </a:extLst>
+        </p:spPr>
+      </p:pic>
+      <p:pic>
+        <p:nvPicPr>
+          <p:cNvPr id="9" name="Picture 8" descr="https://github.com/kubernetes/community/raw/master/icons/png/resources/labeled/deploy-128.png">
+            <a:extLst>
+              <a:ext uri="{FF2B5EF4-FFF2-40B4-BE49-F238E27FC236}">
+                <a16:creationId xmlns:a16="http://schemas.microsoft.com/office/drawing/2014/main" id="{E7074C10-310D-4060-B4FA-71DE1F4A6127}"/>
+              </a:ext>
+            </a:extLst>
+          </p:cNvPr>
+          <p:cNvPicPr>
+            <a:picLocks noChangeAspect="1" noChangeArrowheads="1"/>
+          </p:cNvPicPr>
+          <p:nvPr/>
+        </p:nvPicPr>
+        <p:blipFill>
+          <a:blip r:embed="rId6">
+            <a:extLst>
+              <a:ext uri="{28A0092B-C50C-407E-A947-70E740481C1C}">
+                <a14:useLocalDpi xmlns:a14="http://schemas.microsoft.com/office/drawing/2010/main" val="0"/>
+              </a:ext>
+            </a:extLst>
+          </a:blip>
+          <a:srcRect/>
+          <a:stretch>
+            <a:fillRect/>
+          </a:stretch>
+        </p:blipFill>
+        <p:spPr bwMode="auto">
+          <a:xfrm>
+            <a:off x="494666" y="3452037"/>
+            <a:ext cx="1219200" cy="1219200"/>
+          </a:xfrm>
+          <a:prstGeom prst="rect">
+            <a:avLst/>
+          </a:prstGeom>
+          <a:noFill/>
+          <a:extLst>
+            <a:ext uri="{909E8E84-426E-40DD-AFC4-6F175D3DCCD1}">
+              <a14:hiddenFill xmlns:a14="http://schemas.microsoft.com/office/drawing/2010/main">
+                <a:solidFill>
+                  <a:srgbClr val="FFFFFF"/>
+                </a:solidFill>
+              </a14:hiddenFill>
+            </a:ext>
+          </a:extLst>
+        </p:spPr>
+      </p:pic>
+      <p:pic>
+        <p:nvPicPr>
+          <p:cNvPr id="11" name="Picture 10" descr="https://github.com/kubernetes/community/raw/master/icons/png/resources/labeled/svc-128.png">
+            <a:extLst>
+              <a:ext uri="{FF2B5EF4-FFF2-40B4-BE49-F238E27FC236}">
+                <a16:creationId xmlns:a16="http://schemas.microsoft.com/office/drawing/2014/main" id="{07E9C093-CA8B-416A-838A-ECE75B228612}"/>
+              </a:ext>
+            </a:extLst>
+          </p:cNvPr>
+          <p:cNvPicPr>
+            <a:picLocks noChangeAspect="1" noChangeArrowheads="1"/>
+          </p:cNvPicPr>
+          <p:nvPr/>
+        </p:nvPicPr>
+        <p:blipFill>
+          <a:blip r:embed="rId4">
+            <a:extLst>
+              <a:ext uri="{28A0092B-C50C-407E-A947-70E740481C1C}">
+                <a14:useLocalDpi xmlns:a14="http://schemas.microsoft.com/office/drawing/2010/main" val="0"/>
+              </a:ext>
+            </a:extLst>
+          </a:blip>
+          <a:srcRect/>
+          <a:stretch>
+            <a:fillRect/>
+          </a:stretch>
+        </p:blipFill>
+        <p:spPr bwMode="auto">
+          <a:xfrm>
+            <a:off x="8305943" y="3452037"/>
+            <a:ext cx="1219200" cy="1219200"/>
+          </a:xfrm>
+          <a:prstGeom prst="rect">
+            <a:avLst/>
+          </a:prstGeom>
+          <a:noFill/>
+          <a:extLst>
+            <a:ext uri="{909E8E84-426E-40DD-AFC4-6F175D3DCCD1}">
+              <a14:hiddenFill xmlns:a14="http://schemas.microsoft.com/office/drawing/2010/main">
+                <a:solidFill>
+                  <a:srgbClr val="FFFFFF"/>
+                </a:solidFill>
+              </a14:hiddenFill>
+            </a:ext>
+          </a:extLst>
+        </p:spPr>
+      </p:pic>
+      <p:pic>
+        <p:nvPicPr>
+          <p:cNvPr id="12" name="Picture 4" descr="pod-128.png">
+            <a:extLst>
+              <a:ext uri="{FF2B5EF4-FFF2-40B4-BE49-F238E27FC236}">
+                <a16:creationId xmlns:a16="http://schemas.microsoft.com/office/drawing/2014/main" id="{9E87723B-6780-4D12-9864-F6599CA0ED9A}"/>
+              </a:ext>
+            </a:extLst>
+          </p:cNvPr>
+          <p:cNvPicPr>
+            <a:picLocks noChangeAspect="1" noChangeArrowheads="1"/>
+          </p:cNvPicPr>
+          <p:nvPr/>
+        </p:nvPicPr>
+        <p:blipFill>
+          <a:blip r:embed="rId5">
+            <a:extLst>
+              <a:ext uri="{28A0092B-C50C-407E-A947-70E740481C1C}">
+                <a14:useLocalDpi xmlns:a14="http://schemas.microsoft.com/office/drawing/2010/main" val="0"/>
+              </a:ext>
+            </a:extLst>
+          </a:blip>
+          <a:srcRect/>
+          <a:stretch>
+            <a:fillRect/>
+          </a:stretch>
+        </p:blipFill>
+        <p:spPr bwMode="auto">
+          <a:xfrm>
+            <a:off x="7086743" y="3490832"/>
+            <a:ext cx="1219200" cy="1219200"/>
+          </a:xfrm>
+          <a:prstGeom prst="rect">
+            <a:avLst/>
+          </a:prstGeom>
+          <a:noFill/>
+          <a:extLst>
+            <a:ext uri="{909E8E84-426E-40DD-AFC4-6F175D3DCCD1}">
+              <a14:hiddenFill xmlns:a14="http://schemas.microsoft.com/office/drawing/2010/main">
+                <a:solidFill>
+                  <a:srgbClr val="FFFFFF"/>
+                </a:solidFill>
+              </a14:hiddenFill>
+            </a:ext>
+          </a:extLst>
+        </p:spPr>
+      </p:pic>
+      <p:pic>
+        <p:nvPicPr>
+          <p:cNvPr id="13" name="Picture 12" descr="https://github.com/kubernetes/community/raw/master/icons/png/resources/labeled/deploy-128.png">
+            <a:extLst>
+              <a:ext uri="{FF2B5EF4-FFF2-40B4-BE49-F238E27FC236}">
+                <a16:creationId xmlns:a16="http://schemas.microsoft.com/office/drawing/2014/main" id="{5EE4969B-FACA-438F-BE95-F1FCDB7F5AE8}"/>
+              </a:ext>
+            </a:extLst>
+          </p:cNvPr>
+          <p:cNvPicPr>
+            <a:picLocks noChangeAspect="1" noChangeArrowheads="1"/>
+          </p:cNvPicPr>
+          <p:nvPr/>
+        </p:nvPicPr>
+        <p:blipFill>
+          <a:blip r:embed="rId6">
+            <a:extLst>
+              <a:ext uri="{28A0092B-C50C-407E-A947-70E740481C1C}">
+                <a14:useLocalDpi xmlns:a14="http://schemas.microsoft.com/office/drawing/2010/main" val="0"/>
+              </a:ext>
+            </a:extLst>
+          </a:blip>
+          <a:srcRect/>
+          <a:stretch>
+            <a:fillRect/>
+          </a:stretch>
+        </p:blipFill>
+        <p:spPr bwMode="auto">
+          <a:xfrm>
+            <a:off x="9806731" y="3425397"/>
+            <a:ext cx="1219200" cy="1219200"/>
+          </a:xfrm>
+          <a:prstGeom prst="rect">
+            <a:avLst/>
+          </a:prstGeom>
+          <a:noFill/>
+          <a:extLst>
+            <a:ext uri="{909E8E84-426E-40DD-AFC4-6F175D3DCCD1}">
+              <a14:hiddenFill xmlns:a14="http://schemas.microsoft.com/office/drawing/2010/main">
+                <a:solidFill>
+                  <a:srgbClr val="FFFFFF"/>
+                </a:solidFill>
+              </a14:hiddenFill>
+            </a:ext>
+          </a:extLst>
+        </p:spPr>
+      </p:pic>
+      <p:sp>
+        <p:nvSpPr>
+          <p:cNvPr id="2" name="Rectangle 1">
+            <a:extLst>
+              <a:ext uri="{FF2B5EF4-FFF2-40B4-BE49-F238E27FC236}">
+                <a16:creationId xmlns:a16="http://schemas.microsoft.com/office/drawing/2014/main" id="{6EE999FE-FA3B-454F-8081-B6A44248143B}"/>
+              </a:ext>
+            </a:extLst>
+          </p:cNvPr>
+          <p:cNvSpPr/>
+          <p:nvPr/>
+        </p:nvSpPr>
+        <p:spPr>
+          <a:xfrm>
+            <a:off x="350096" y="3024889"/>
+            <a:ext cx="4219663" cy="3447875"/>
+          </a:xfrm>
+          <a:prstGeom prst="rect">
+            <a:avLst/>
+          </a:prstGeom>
+          <a:noFill/>
+        </p:spPr>
+        <p:style>
+          <a:lnRef idx="2">
+            <a:schemeClr val="accent1">
+              <a:shade val="50000"/>
+            </a:schemeClr>
+          </a:lnRef>
+          <a:fillRef idx="1">
+            <a:schemeClr val="accent1"/>
+          </a:fillRef>
+          <a:effectRef idx="0">
+            <a:schemeClr val="accent1"/>
+          </a:effectRef>
+          <a:fontRef idx="minor">
+            <a:schemeClr val="lt1"/>
+          </a:fontRef>
+        </p:style>
+        <p:txBody>
+          <a:bodyPr rtlCol="0" anchor="ctr"/>
+          <a:lstStyle/>
+          <a:p>
+            <a:pPr algn="ctr"/>
+            <a:endParaRPr lang="en-US"/>
+          </a:p>
+        </p:txBody>
+      </p:sp>
+      <p:sp>
+        <p:nvSpPr>
+          <p:cNvPr id="14" name="Rectangle 13">
+            <a:extLst>
+              <a:ext uri="{FF2B5EF4-FFF2-40B4-BE49-F238E27FC236}">
+                <a16:creationId xmlns:a16="http://schemas.microsoft.com/office/drawing/2014/main" id="{7E56CC2D-5B3F-4BC4-B222-5FC38DEE9A9F}"/>
+              </a:ext>
+            </a:extLst>
+          </p:cNvPr>
+          <p:cNvSpPr/>
+          <p:nvPr/>
+        </p:nvSpPr>
+        <p:spPr>
+          <a:xfrm>
+            <a:off x="6941608" y="3024889"/>
+            <a:ext cx="4219663" cy="3447875"/>
+          </a:xfrm>
+          <a:prstGeom prst="rect">
+            <a:avLst/>
+          </a:prstGeom>
+          <a:noFill/>
+        </p:spPr>
+        <p:style>
+          <a:lnRef idx="2">
+            <a:schemeClr val="accent1">
+              <a:shade val="50000"/>
+            </a:schemeClr>
+          </a:lnRef>
+          <a:fillRef idx="1">
+            <a:schemeClr val="accent1"/>
+          </a:fillRef>
+          <a:effectRef idx="0">
+            <a:schemeClr val="accent1"/>
+          </a:effectRef>
+          <a:fontRef idx="minor">
+            <a:schemeClr val="lt1"/>
+          </a:fontRef>
+        </p:style>
+        <p:txBody>
+          <a:bodyPr rtlCol="0" anchor="ctr"/>
+          <a:lstStyle/>
+          <a:p>
+            <a:pPr algn="ctr"/>
+            <a:endParaRPr lang="en-US"/>
+          </a:p>
+        </p:txBody>
+      </p:sp>
+      <p:cxnSp>
+        <p:nvCxnSpPr>
+          <p:cNvPr id="15" name="Straight Arrow Connector 14">
+            <a:extLst>
+              <a:ext uri="{FF2B5EF4-FFF2-40B4-BE49-F238E27FC236}">
+                <a16:creationId xmlns:a16="http://schemas.microsoft.com/office/drawing/2014/main" id="{7C153C8F-11B5-4031-92AE-35781EFF8AA0}"/>
+              </a:ext>
+            </a:extLst>
+          </p:cNvPr>
+          <p:cNvCxnSpPr>
+            <a:cxnSpLocks/>
+          </p:cNvCxnSpPr>
+          <p:nvPr/>
+        </p:nvCxnSpPr>
+        <p:spPr>
+          <a:xfrm>
+            <a:off x="9253057" y="285226"/>
+            <a:ext cx="0" cy="2739663"/>
+          </a:xfrm>
+          <a:prstGeom prst="straightConnector1">
+            <a:avLst/>
+          </a:prstGeom>
+          <a:ln>
+            <a:tailEnd type="triangle"/>
+          </a:ln>
+        </p:spPr>
+        <p:style>
+          <a:lnRef idx="1">
+            <a:schemeClr val="accent1"/>
+          </a:lnRef>
+          <a:fillRef idx="0">
+            <a:schemeClr val="accent1"/>
+          </a:fillRef>
+          <a:effectRef idx="0">
+            <a:schemeClr val="accent1"/>
+          </a:effectRef>
+          <a:fontRef idx="minor">
+            <a:schemeClr val="tx1"/>
+          </a:fontRef>
+        </p:style>
+      </p:cxnSp>
+      <p:sp>
+        <p:nvSpPr>
+          <p:cNvPr id="16" name="TextBox 15">
+            <a:extLst>
+              <a:ext uri="{FF2B5EF4-FFF2-40B4-BE49-F238E27FC236}">
+                <a16:creationId xmlns:a16="http://schemas.microsoft.com/office/drawing/2014/main" id="{DBD64E9D-6E1D-471F-B96B-100072D35C64}"/>
+              </a:ext>
+            </a:extLst>
+          </p:cNvPr>
+          <p:cNvSpPr txBox="1"/>
+          <p:nvPr/>
+        </p:nvSpPr>
+        <p:spPr>
+          <a:xfrm>
+            <a:off x="6941608" y="2620443"/>
+            <a:ext cx="701026" cy="369332"/>
+          </a:xfrm>
+          <a:prstGeom prst="rect">
+            <a:avLst/>
+          </a:prstGeom>
+          <a:noFill/>
+        </p:spPr>
+        <p:txBody>
+          <a:bodyPr wrap="none" rtlCol="0">
+            <a:spAutoFit/>
+          </a:bodyPr>
+          <a:lstStyle/>
+          <a:p>
+            <a:r>
+              <a:rPr lang="en-US" dirty="0" err="1"/>
+              <a:t>ngrok</a:t>
+            </a:r>
+            <a:endParaRPr lang="en-US" dirty="0"/>
+          </a:p>
+        </p:txBody>
+      </p:sp>
+      <p:sp>
+        <p:nvSpPr>
+          <p:cNvPr id="17" name="TextBox 16">
+            <a:extLst>
+              <a:ext uri="{FF2B5EF4-FFF2-40B4-BE49-F238E27FC236}">
+                <a16:creationId xmlns:a16="http://schemas.microsoft.com/office/drawing/2014/main" id="{BE48BD5F-4865-4E97-95FA-F6054EC9BEC0}"/>
+              </a:ext>
+            </a:extLst>
+          </p:cNvPr>
+          <p:cNvSpPr txBox="1"/>
+          <p:nvPr/>
+        </p:nvSpPr>
+        <p:spPr>
+          <a:xfrm>
+            <a:off x="631889" y="5902313"/>
+            <a:ext cx="3503395" cy="369332"/>
+          </a:xfrm>
+          <a:prstGeom prst="rect">
+            <a:avLst/>
+          </a:prstGeom>
+          <a:noFill/>
+        </p:spPr>
+        <p:txBody>
+          <a:bodyPr wrap="none" rtlCol="0">
+            <a:spAutoFit/>
+          </a:bodyPr>
+          <a:lstStyle/>
+          <a:p>
+            <a:r>
+              <a:rPr lang="en-US" dirty="0" err="1"/>
+              <a:t>Bet.AspNetCore.EventGrid.WebApp</a:t>
+            </a:r>
+            <a:endParaRPr lang="en-US" dirty="0"/>
+          </a:p>
+        </p:txBody>
+      </p:sp>
+      <p:sp>
+        <p:nvSpPr>
+          <p:cNvPr id="18" name="TextBox 17">
+            <a:extLst>
+              <a:ext uri="{FF2B5EF4-FFF2-40B4-BE49-F238E27FC236}">
+                <a16:creationId xmlns:a16="http://schemas.microsoft.com/office/drawing/2014/main" id="{0332D353-8988-4184-913B-F02F0BF10DD2}"/>
+              </a:ext>
+            </a:extLst>
+          </p:cNvPr>
+          <p:cNvSpPr txBox="1"/>
+          <p:nvPr/>
+        </p:nvSpPr>
+        <p:spPr>
+          <a:xfrm>
+            <a:off x="1367803" y="1243778"/>
+            <a:ext cx="527709" cy="369332"/>
+          </a:xfrm>
+          <a:prstGeom prst="rect">
+            <a:avLst/>
+          </a:prstGeom>
+          <a:noFill/>
+        </p:spPr>
+        <p:txBody>
+          <a:bodyPr wrap="none" rtlCol="0">
+            <a:spAutoFit/>
+          </a:bodyPr>
+          <a:lstStyle/>
+          <a:p>
+            <a:r>
+              <a:rPr lang="en-US" dirty="0"/>
+              <a:t>dev</a:t>
+            </a:r>
+          </a:p>
+        </p:txBody>
+      </p:sp>
+      <p:sp>
+        <p:nvSpPr>
+          <p:cNvPr id="19" name="Rectangle 18">
+            <a:extLst>
+              <a:ext uri="{FF2B5EF4-FFF2-40B4-BE49-F238E27FC236}">
+                <a16:creationId xmlns:a16="http://schemas.microsoft.com/office/drawing/2014/main" id="{F8AA9A97-D04C-4520-A588-7628BEBB764A}"/>
+              </a:ext>
+            </a:extLst>
+          </p:cNvPr>
+          <p:cNvSpPr/>
+          <p:nvPr/>
+        </p:nvSpPr>
+        <p:spPr>
+          <a:xfrm>
+            <a:off x="254941" y="1563882"/>
+            <a:ext cx="11586955" cy="5138922"/>
+          </a:xfrm>
+          <a:prstGeom prst="rect">
+            <a:avLst/>
+          </a:prstGeom>
+          <a:noFill/>
+        </p:spPr>
+        <p:style>
+          <a:lnRef idx="2">
+            <a:schemeClr val="accent1">
+              <a:shade val="50000"/>
+            </a:schemeClr>
+          </a:lnRef>
+          <a:fillRef idx="1">
+            <a:schemeClr val="accent1"/>
+          </a:fillRef>
+          <a:effectRef idx="0">
+            <a:schemeClr val="accent1"/>
+          </a:effectRef>
+          <a:fontRef idx="minor">
+            <a:schemeClr val="lt1"/>
+          </a:fontRef>
+        </p:style>
+        <p:txBody>
+          <a:bodyPr rtlCol="0" anchor="ctr"/>
+          <a:lstStyle/>
+          <a:p>
+            <a:pPr algn="ctr"/>
+            <a:endParaRPr lang="en-US"/>
+          </a:p>
+        </p:txBody>
+      </p:sp>
+      <p:cxnSp>
+        <p:nvCxnSpPr>
+          <p:cNvPr id="21" name="Straight Arrow Connector 20">
+            <a:extLst>
+              <a:ext uri="{FF2B5EF4-FFF2-40B4-BE49-F238E27FC236}">
+                <a16:creationId xmlns:a16="http://schemas.microsoft.com/office/drawing/2014/main" id="{4E001BF0-CA58-4B85-8DC3-BF745471F04A}"/>
+              </a:ext>
+            </a:extLst>
+          </p:cNvPr>
+          <p:cNvCxnSpPr>
+            <a:cxnSpLocks/>
+          </p:cNvCxnSpPr>
+          <p:nvPr/>
+        </p:nvCxnSpPr>
+        <p:spPr>
+          <a:xfrm>
+            <a:off x="4569759" y="4061637"/>
+            <a:ext cx="2371849" cy="0"/>
+          </a:xfrm>
+          <a:prstGeom prst="straightConnector1">
+            <a:avLst/>
+          </a:prstGeom>
+          <a:ln>
+            <a:tailEnd type="triangle"/>
+          </a:ln>
+        </p:spPr>
+        <p:style>
+          <a:lnRef idx="1">
+            <a:schemeClr val="accent1"/>
+          </a:lnRef>
+          <a:fillRef idx="0">
+            <a:schemeClr val="accent1"/>
+          </a:fillRef>
+          <a:effectRef idx="0">
+            <a:schemeClr val="accent1"/>
+          </a:effectRef>
+          <a:fontRef idx="minor">
+            <a:schemeClr val="tx1"/>
+          </a:fontRef>
+        </p:style>
+      </p:cxnSp>
+      <p:cxnSp>
+        <p:nvCxnSpPr>
+          <p:cNvPr id="23" name="Straight Arrow Connector 22">
+            <a:extLst>
+              <a:ext uri="{FF2B5EF4-FFF2-40B4-BE49-F238E27FC236}">
+                <a16:creationId xmlns:a16="http://schemas.microsoft.com/office/drawing/2014/main" id="{1AA2F16A-51CE-439F-BF47-D9593A6B9AC2}"/>
+              </a:ext>
+            </a:extLst>
+          </p:cNvPr>
+          <p:cNvCxnSpPr/>
+          <p:nvPr/>
+        </p:nvCxnSpPr>
+        <p:spPr>
+          <a:xfrm flipH="1">
+            <a:off x="4569759" y="4496499"/>
+            <a:ext cx="2371849" cy="0"/>
+          </a:xfrm>
+          <a:prstGeom prst="straightConnector1">
+            <a:avLst/>
+          </a:prstGeom>
+          <a:ln>
+            <a:tailEnd type="triangle"/>
+          </a:ln>
+        </p:spPr>
+        <p:style>
+          <a:lnRef idx="1">
+            <a:schemeClr val="accent1"/>
+          </a:lnRef>
+          <a:fillRef idx="0">
+            <a:schemeClr val="accent1"/>
+          </a:fillRef>
+          <a:effectRef idx="0">
+            <a:schemeClr val="accent1"/>
+          </a:effectRef>
+          <a:fontRef idx="minor">
+            <a:schemeClr val="tx1"/>
+          </a:fontRef>
+        </p:style>
+      </p:cxnSp>
+      <p:sp>
+        <p:nvSpPr>
+          <p:cNvPr id="25" name="TextBox 24">
+            <a:extLst>
+              <a:ext uri="{FF2B5EF4-FFF2-40B4-BE49-F238E27FC236}">
+                <a16:creationId xmlns:a16="http://schemas.microsoft.com/office/drawing/2014/main" id="{831821DC-57FC-431E-AD44-7A9F1D927FA3}"/>
+              </a:ext>
+            </a:extLst>
+          </p:cNvPr>
+          <p:cNvSpPr txBox="1"/>
+          <p:nvPr/>
+        </p:nvSpPr>
+        <p:spPr>
+          <a:xfrm>
+            <a:off x="6507326" y="385236"/>
+            <a:ext cx="2723823" cy="369332"/>
+          </a:xfrm>
+          <a:prstGeom prst="rect">
+            <a:avLst/>
+          </a:prstGeom>
+          <a:noFill/>
+        </p:spPr>
+        <p:txBody>
+          <a:bodyPr wrap="none" rtlCol="0">
+            <a:spAutoFit/>
+          </a:bodyPr>
+          <a:lstStyle/>
+          <a:p>
+            <a:r>
+              <a:rPr lang="en-US" dirty="0"/>
+              <a:t>https://39ed2f84.ngrok.io</a:t>
+            </a:r>
+          </a:p>
+        </p:txBody>
+      </p:sp>
+      <p:sp>
+        <p:nvSpPr>
+          <p:cNvPr id="26" name="Rectangle 25">
+            <a:extLst>
+              <a:ext uri="{FF2B5EF4-FFF2-40B4-BE49-F238E27FC236}">
+                <a16:creationId xmlns:a16="http://schemas.microsoft.com/office/drawing/2014/main" id="{F99B3754-A544-4D17-85C0-810F0D818C3B}"/>
+              </a:ext>
+            </a:extLst>
+          </p:cNvPr>
+          <p:cNvSpPr/>
+          <p:nvPr/>
+        </p:nvSpPr>
+        <p:spPr>
+          <a:xfrm>
+            <a:off x="9443754" y="385236"/>
+            <a:ext cx="1390124" cy="369332"/>
+          </a:xfrm>
+          <a:prstGeom prst="rect">
+            <a:avLst/>
+          </a:prstGeom>
+        </p:spPr>
+        <p:txBody>
+          <a:bodyPr wrap="none">
+            <a:spAutoFit/>
+          </a:bodyPr>
+          <a:lstStyle/>
+          <a:p>
+            <a:r>
+              <a:rPr lang="en-US" dirty="0">
+                <a:solidFill>
+                  <a:srgbClr val="333333"/>
+                </a:solidFill>
+                <a:latin typeface="Helvetica Neue"/>
+              </a:rPr>
+              <a:t>External </a:t>
+            </a:r>
+            <a:r>
+              <a:rPr lang="en-US" dirty="0" err="1">
+                <a:solidFill>
+                  <a:srgbClr val="333333"/>
+                </a:solidFill>
+                <a:latin typeface="Helvetica Neue"/>
+              </a:rPr>
+              <a:t>Url</a:t>
+            </a:r>
+            <a:endParaRPr lang="en-US" dirty="0"/>
+          </a:p>
+        </p:txBody>
+      </p:sp>
+      <p:sp>
+        <p:nvSpPr>
+          <p:cNvPr id="28" name="Rectangle 27">
+            <a:extLst>
+              <a:ext uri="{FF2B5EF4-FFF2-40B4-BE49-F238E27FC236}">
+                <a16:creationId xmlns:a16="http://schemas.microsoft.com/office/drawing/2014/main" id="{62A974AE-6E3D-4B01-BF49-69D7520058B8}"/>
+              </a:ext>
+            </a:extLst>
+          </p:cNvPr>
+          <p:cNvSpPr/>
+          <p:nvPr/>
+        </p:nvSpPr>
+        <p:spPr>
+          <a:xfrm>
+            <a:off x="7025960" y="4946264"/>
+            <a:ext cx="4050957" cy="1200329"/>
+          </a:xfrm>
+          <a:prstGeom prst="rect">
+            <a:avLst/>
+          </a:prstGeom>
+        </p:spPr>
+        <p:txBody>
+          <a:bodyPr wrap="square">
+            <a:spAutoFit/>
+          </a:bodyPr>
+          <a:lstStyle/>
+          <a:p>
+            <a:r>
+              <a:rPr lang="en-US" sz="1200" dirty="0"/>
+              <a:t>command: ["</a:t>
+            </a:r>
+            <a:r>
+              <a:rPr lang="en-US" sz="1200" dirty="0" err="1"/>
+              <a:t>ngrok</a:t>
+            </a:r>
+            <a:r>
+              <a:rPr lang="en-US" sz="1200" dirty="0"/>
+              <a:t>"]</a:t>
+            </a:r>
+          </a:p>
+          <a:p>
+            <a:r>
+              <a:rPr lang="en-US" sz="1200" dirty="0"/>
+              <a:t>          </a:t>
+            </a:r>
+            <a:r>
+              <a:rPr lang="en-US" sz="1200" dirty="0" err="1"/>
+              <a:t>args</a:t>
+            </a:r>
+            <a:r>
+              <a:rPr lang="en-US" sz="1200" dirty="0"/>
+              <a:t>: ["http", "{{ .</a:t>
+            </a:r>
+            <a:r>
+              <a:rPr lang="en-US" sz="1200" dirty="0" err="1"/>
+              <a:t>Release.Name</a:t>
+            </a:r>
+            <a:r>
+              <a:rPr lang="en-US" sz="1200" dirty="0"/>
+              <a:t> }}-bet-</a:t>
+            </a:r>
+            <a:r>
+              <a:rPr lang="en-US" sz="1200" dirty="0" err="1"/>
+              <a:t>eventgrid</a:t>
+            </a:r>
+            <a:r>
+              <a:rPr lang="en-US" sz="1200" dirty="0"/>
+              <a:t>-web"]</a:t>
+            </a:r>
+          </a:p>
+          <a:p>
+            <a:r>
+              <a:rPr lang="en-US" sz="1200" dirty="0"/>
+              <a:t>          ports:</a:t>
+            </a:r>
+          </a:p>
+          <a:p>
+            <a:r>
+              <a:rPr lang="en-US" sz="1200" dirty="0"/>
+              <a:t>            - name: http</a:t>
+            </a:r>
+          </a:p>
+          <a:p>
+            <a:r>
+              <a:rPr lang="en-US" sz="1200" dirty="0"/>
+              <a:t>              </a:t>
+            </a:r>
+            <a:r>
+              <a:rPr lang="en-US" sz="1200" dirty="0" err="1"/>
+              <a:t>containerPort</a:t>
+            </a:r>
+            <a:r>
+              <a:rPr lang="en-US" sz="1200" dirty="0"/>
+              <a:t>: 4040</a:t>
+            </a:r>
+          </a:p>
+          <a:p>
+            <a:r>
+              <a:rPr lang="en-US" sz="1200" dirty="0"/>
+              <a:t>              protocol: TCP</a:t>
+            </a:r>
+          </a:p>
+        </p:txBody>
+      </p:sp>
     </p:spTree>
     <p:extLst>
       <p:ext uri="{BB962C8B-B14F-4D97-AF65-F5344CB8AC3E}">

</xml_diff>